<commit_message>
Updated UG and DG for final submission, including page breaks
</commit_message>
<xml_diff>
--- a/docs/images/userguideimages/Powerpoints/User Guide Section 3 Getting Started.pptx
+++ b/docs/images/userguideimages/Powerpoints/User Guide Section 3 Getting Started.pptx
@@ -108,6 +108,11 @@
       </a:defRPr>
     </a:lvl9pPr>
   </p:defaultTextStyle>
+  <p:extLst>
+    <p:ext uri="{EFAFB233-063F-42B5-8137-9DF3F51BA10A}">
+      <p15:sldGuideLst xmlns:p15="http://schemas.microsoft.com/office/powerpoint/2012/main"/>
+    </p:ext>
+  </p:extLst>
 </p:presentation>
 </file>
 
@@ -260,7 +265,7 @@
           <a:p>
             <a:fld id="{FCEE63F7-FFD2-4F41-912F-CC1A957A0964}" type="datetimeFigureOut">
               <a:rPr lang="en-SG" smtClean="0"/>
-              <a:t>7/11/2020</a:t>
+              <a:t>9/11/2020</a:t>
             </a:fld>
             <a:endParaRPr lang="en-SG"/>
           </a:p>
@@ -460,7 +465,7 @@
           <a:p>
             <a:fld id="{FCEE63F7-FFD2-4F41-912F-CC1A957A0964}" type="datetimeFigureOut">
               <a:rPr lang="en-SG" smtClean="0"/>
-              <a:t>7/11/2020</a:t>
+              <a:t>9/11/2020</a:t>
             </a:fld>
             <a:endParaRPr lang="en-SG"/>
           </a:p>
@@ -670,7 +675,7 @@
           <a:p>
             <a:fld id="{FCEE63F7-FFD2-4F41-912F-CC1A957A0964}" type="datetimeFigureOut">
               <a:rPr lang="en-SG" smtClean="0"/>
-              <a:t>7/11/2020</a:t>
+              <a:t>9/11/2020</a:t>
             </a:fld>
             <a:endParaRPr lang="en-SG"/>
           </a:p>
@@ -870,7 +875,7 @@
           <a:p>
             <a:fld id="{FCEE63F7-FFD2-4F41-912F-CC1A957A0964}" type="datetimeFigureOut">
               <a:rPr lang="en-SG" smtClean="0"/>
-              <a:t>7/11/2020</a:t>
+              <a:t>9/11/2020</a:t>
             </a:fld>
             <a:endParaRPr lang="en-SG"/>
           </a:p>
@@ -1146,7 +1151,7 @@
           <a:p>
             <a:fld id="{FCEE63F7-FFD2-4F41-912F-CC1A957A0964}" type="datetimeFigureOut">
               <a:rPr lang="en-SG" smtClean="0"/>
-              <a:t>7/11/2020</a:t>
+              <a:t>9/11/2020</a:t>
             </a:fld>
             <a:endParaRPr lang="en-SG"/>
           </a:p>
@@ -1414,7 +1419,7 @@
           <a:p>
             <a:fld id="{FCEE63F7-FFD2-4F41-912F-CC1A957A0964}" type="datetimeFigureOut">
               <a:rPr lang="en-SG" smtClean="0"/>
-              <a:t>7/11/2020</a:t>
+              <a:t>9/11/2020</a:t>
             </a:fld>
             <a:endParaRPr lang="en-SG"/>
           </a:p>
@@ -1829,7 +1834,7 @@
           <a:p>
             <a:fld id="{FCEE63F7-FFD2-4F41-912F-CC1A957A0964}" type="datetimeFigureOut">
               <a:rPr lang="en-SG" smtClean="0"/>
-              <a:t>7/11/2020</a:t>
+              <a:t>9/11/2020</a:t>
             </a:fld>
             <a:endParaRPr lang="en-SG"/>
           </a:p>
@@ -1971,7 +1976,7 @@
           <a:p>
             <a:fld id="{FCEE63F7-FFD2-4F41-912F-CC1A957A0964}" type="datetimeFigureOut">
               <a:rPr lang="en-SG" smtClean="0"/>
-              <a:t>7/11/2020</a:t>
+              <a:t>9/11/2020</a:t>
             </a:fld>
             <a:endParaRPr lang="en-SG"/>
           </a:p>
@@ -2084,7 +2089,7 @@
           <a:p>
             <a:fld id="{FCEE63F7-FFD2-4F41-912F-CC1A957A0964}" type="datetimeFigureOut">
               <a:rPr lang="en-SG" smtClean="0"/>
-              <a:t>7/11/2020</a:t>
+              <a:t>9/11/2020</a:t>
             </a:fld>
             <a:endParaRPr lang="en-SG"/>
           </a:p>
@@ -2397,7 +2402,7 @@
           <a:p>
             <a:fld id="{FCEE63F7-FFD2-4F41-912F-CC1A957A0964}" type="datetimeFigureOut">
               <a:rPr lang="en-SG" smtClean="0"/>
-              <a:t>7/11/2020</a:t>
+              <a:t>9/11/2020</a:t>
             </a:fld>
             <a:endParaRPr lang="en-SG"/>
           </a:p>
@@ -2686,7 +2691,7 @@
           <a:p>
             <a:fld id="{FCEE63F7-FFD2-4F41-912F-CC1A957A0964}" type="datetimeFigureOut">
               <a:rPr lang="en-SG" smtClean="0"/>
-              <a:t>7/11/2020</a:t>
+              <a:t>9/11/2020</a:t>
             </a:fld>
             <a:endParaRPr lang="en-SG"/>
           </a:p>
@@ -2929,7 +2934,7 @@
           <a:p>
             <a:fld id="{FCEE63F7-FFD2-4F41-912F-CC1A957A0964}" type="datetimeFigureOut">
               <a:rPr lang="en-SG" smtClean="0"/>
-              <a:t>7/11/2020</a:t>
+              <a:t>9/11/2020</a:t>
             </a:fld>
             <a:endParaRPr lang="en-SG"/>
           </a:p>
@@ -3348,10 +3353,10 @@
       </p:grpSpPr>
       <p:grpSp>
         <p:nvGrpSpPr>
-          <p:cNvPr id="16" name="Group 15">
-            <a:extLst>
-              <a:ext uri="{FF2B5EF4-FFF2-40B4-BE49-F238E27FC236}">
-                <a16:creationId xmlns:a16="http://schemas.microsoft.com/office/drawing/2014/main" id="{E5EB81AD-FB51-4F30-A658-ECD4027B7E05}"/>
+          <p:cNvPr id="2" name="Group 1">
+            <a:extLst>
+              <a:ext uri="{FF2B5EF4-FFF2-40B4-BE49-F238E27FC236}">
+                <a16:creationId xmlns:a16="http://schemas.microsoft.com/office/drawing/2014/main" id="{AAE17EC3-AE49-496E-AFAA-F754D0C50210}"/>
               </a:ext>
             </a:extLst>
           </p:cNvPr>
@@ -3883,10 +3888,10 @@
       </p:grpSpPr>
       <p:grpSp>
         <p:nvGrpSpPr>
-          <p:cNvPr id="12" name="Group 11">
-            <a:extLst>
-              <a:ext uri="{FF2B5EF4-FFF2-40B4-BE49-F238E27FC236}">
-                <a16:creationId xmlns:a16="http://schemas.microsoft.com/office/drawing/2014/main" id="{70CE04B9-C43A-43AA-8F7D-9B80EF184EB9}"/>
+          <p:cNvPr id="7" name="Group 6">
+            <a:extLst>
+              <a:ext uri="{FF2B5EF4-FFF2-40B4-BE49-F238E27FC236}">
+                <a16:creationId xmlns:a16="http://schemas.microsoft.com/office/drawing/2014/main" id="{57E36EBB-4E30-41E8-8A72-347F4C123A4A}"/>
               </a:ext>
             </a:extLst>
           </p:cNvPr>
@@ -3903,10 +3908,10 @@
         </p:grpSpPr>
         <p:grpSp>
           <p:nvGrpSpPr>
-            <p:cNvPr id="10" name="Group 9">
+            <p:cNvPr id="12" name="Group 11">
               <a:extLst>
                 <a:ext uri="{FF2B5EF4-FFF2-40B4-BE49-F238E27FC236}">
-                  <a16:creationId xmlns:a16="http://schemas.microsoft.com/office/drawing/2014/main" id="{C5D9B7F4-2DE2-4BB7-9C6D-671C349BC67F}"/>
+                  <a16:creationId xmlns:a16="http://schemas.microsoft.com/office/drawing/2014/main" id="{70CE04B9-C43A-43AA-8F7D-9B80EF184EB9}"/>
                 </a:ext>
               </a:extLst>
             </p:cNvPr>
@@ -3921,12 +3926,247 @@
               <a:chExt cx="9137172" cy="6477561"/>
             </a:xfrm>
           </p:grpSpPr>
+          <p:grpSp>
+            <p:nvGrpSpPr>
+              <p:cNvPr id="10" name="Group 9">
+                <a:extLst>
+                  <a:ext uri="{FF2B5EF4-FFF2-40B4-BE49-F238E27FC236}">
+                    <a16:creationId xmlns:a16="http://schemas.microsoft.com/office/drawing/2014/main" id="{C5D9B7F4-2DE2-4BB7-9C6D-671C349BC67F}"/>
+                  </a:ext>
+                </a:extLst>
+              </p:cNvPr>
+              <p:cNvGrpSpPr/>
+              <p:nvPr/>
+            </p:nvGrpSpPr>
+            <p:grpSpPr>
+              <a:xfrm>
+                <a:off x="1527414" y="190219"/>
+                <a:ext cx="9137172" cy="6477561"/>
+                <a:chOff x="1527414" y="190219"/>
+                <a:chExt cx="9137172" cy="6477561"/>
+              </a:xfrm>
+            </p:grpSpPr>
+            <p:pic>
+              <p:nvPicPr>
+                <p:cNvPr id="4" name="Picture 3">
+                  <a:extLst>
+                    <a:ext uri="{FF2B5EF4-FFF2-40B4-BE49-F238E27FC236}">
+                      <a16:creationId xmlns:a16="http://schemas.microsoft.com/office/drawing/2014/main" id="{7BB2E53D-51D0-4D37-89A3-C922B692011B}"/>
+                    </a:ext>
+                  </a:extLst>
+                </p:cNvPr>
+                <p:cNvPicPr>
+                  <a:picLocks noChangeAspect="1"/>
+                </p:cNvPicPr>
+                <p:nvPr/>
+              </p:nvPicPr>
+              <p:blipFill>
+                <a:blip r:embed="rId2"/>
+                <a:stretch>
+                  <a:fillRect/>
+                </a:stretch>
+              </p:blipFill>
+              <p:spPr>
+                <a:xfrm>
+                  <a:off x="1527414" y="190219"/>
+                  <a:ext cx="9137172" cy="6477561"/>
+                </a:xfrm>
+                <a:prstGeom prst="rect">
+                  <a:avLst/>
+                </a:prstGeom>
+              </p:spPr>
+            </p:pic>
+            <p:sp>
+              <p:nvSpPr>
+                <p:cNvPr id="5" name="Rectangle 4">
+                  <a:extLst>
+                    <a:ext uri="{FF2B5EF4-FFF2-40B4-BE49-F238E27FC236}">
+                      <a16:creationId xmlns:a16="http://schemas.microsoft.com/office/drawing/2014/main" id="{01CAAEE8-929D-4C66-8B7D-4B4DDA129D5E}"/>
+                    </a:ext>
+                  </a:extLst>
+                </p:cNvPr>
+                <p:cNvSpPr/>
+                <p:nvPr/>
+              </p:nvSpPr>
+              <p:spPr>
+                <a:xfrm>
+                  <a:off x="6295192" y="4301323"/>
+                  <a:ext cx="4127191" cy="616905"/>
+                </a:xfrm>
+                <a:prstGeom prst="rect">
+                  <a:avLst/>
+                </a:prstGeom>
+                <a:noFill/>
+                <a:ln w="38100">
+                  <a:solidFill>
+                    <a:srgbClr val="FF0000"/>
+                  </a:solidFill>
+                </a:ln>
+              </p:spPr>
+              <p:style>
+                <a:lnRef idx="2">
+                  <a:schemeClr val="accent1">
+                    <a:shade val="50000"/>
+                  </a:schemeClr>
+                </a:lnRef>
+                <a:fillRef idx="1">
+                  <a:schemeClr val="accent1"/>
+                </a:fillRef>
+                <a:effectRef idx="0">
+                  <a:schemeClr val="accent1"/>
+                </a:effectRef>
+                <a:fontRef idx="minor">
+                  <a:schemeClr val="lt1"/>
+                </a:fontRef>
+              </p:style>
+              <p:txBody>
+                <a:bodyPr rtlCol="0" anchor="ctr"/>
+                <a:lstStyle/>
+                <a:p>
+                  <a:pPr algn="ctr"/>
+                  <a:endParaRPr lang="en-SG"/>
+                </a:p>
+              </p:txBody>
+            </p:sp>
+            <p:sp>
+              <p:nvSpPr>
+                <p:cNvPr id="6" name="Rectangle 5">
+                  <a:extLst>
+                    <a:ext uri="{FF2B5EF4-FFF2-40B4-BE49-F238E27FC236}">
+                      <a16:creationId xmlns:a16="http://schemas.microsoft.com/office/drawing/2014/main" id="{FC8A94D2-2A58-4630-A9F8-7C0B86C8E63F}"/>
+                    </a:ext>
+                  </a:extLst>
+                </p:cNvPr>
+                <p:cNvSpPr/>
+                <p:nvPr/>
+              </p:nvSpPr>
+              <p:spPr>
+                <a:xfrm>
+                  <a:off x="1802167" y="1603904"/>
+                  <a:ext cx="8398276" cy="276232"/>
+                </a:xfrm>
+                <a:prstGeom prst="rect">
+                  <a:avLst/>
+                </a:prstGeom>
+                <a:noFill/>
+                <a:ln w="38100">
+                  <a:solidFill>
+                    <a:srgbClr val="FF0000"/>
+                  </a:solidFill>
+                </a:ln>
+              </p:spPr>
+              <p:style>
+                <a:lnRef idx="2">
+                  <a:schemeClr val="accent1">
+                    <a:shade val="50000"/>
+                  </a:schemeClr>
+                </a:lnRef>
+                <a:fillRef idx="1">
+                  <a:schemeClr val="accent1"/>
+                </a:fillRef>
+                <a:effectRef idx="0">
+                  <a:schemeClr val="accent1"/>
+                </a:effectRef>
+                <a:fontRef idx="minor">
+                  <a:schemeClr val="lt1"/>
+                </a:fontRef>
+              </p:style>
+              <p:txBody>
+                <a:bodyPr rtlCol="0" anchor="ctr"/>
+                <a:lstStyle/>
+                <a:p>
+                  <a:pPr algn="ctr"/>
+                  <a:endParaRPr lang="en-SG"/>
+                </a:p>
+              </p:txBody>
+            </p:sp>
+            <p:sp>
+              <p:nvSpPr>
+                <p:cNvPr id="8" name="TextBox 7">
+                  <a:extLst>
+                    <a:ext uri="{FF2B5EF4-FFF2-40B4-BE49-F238E27FC236}">
+                      <a16:creationId xmlns:a16="http://schemas.microsoft.com/office/drawing/2014/main" id="{96CA8365-996B-4818-8115-F9717BCF9969}"/>
+                    </a:ext>
+                  </a:extLst>
+                </p:cNvPr>
+                <p:cNvSpPr txBox="1"/>
+                <p:nvPr/>
+              </p:nvSpPr>
+              <p:spPr>
+                <a:xfrm>
+                  <a:off x="6295192" y="4938783"/>
+                  <a:ext cx="3275860" cy="369332"/>
+                </a:xfrm>
+                <a:prstGeom prst="rect">
+                  <a:avLst/>
+                </a:prstGeom>
+                <a:noFill/>
+              </p:spPr>
+              <p:txBody>
+                <a:bodyPr wrap="square" rtlCol="0">
+                  <a:spAutoFit/>
+                </a:bodyPr>
+                <a:lstStyle/>
+                <a:p>
+                  <a:pPr algn="ctr"/>
+                  <a:r>
+                    <a:rPr lang="en-SG" dirty="0">
+                      <a:solidFill>
+                        <a:srgbClr val="FF0000"/>
+                      </a:solidFill>
+                    </a:rPr>
+                    <a:t>New itinerary has been created!</a:t>
+                  </a:r>
+                </a:p>
+              </p:txBody>
+            </p:sp>
+            <p:sp>
+              <p:nvSpPr>
+                <p:cNvPr id="9" name="TextBox 8">
+                  <a:extLst>
+                    <a:ext uri="{FF2B5EF4-FFF2-40B4-BE49-F238E27FC236}">
+                      <a16:creationId xmlns:a16="http://schemas.microsoft.com/office/drawing/2014/main" id="{33550A51-5C89-46C5-98D4-595BFC541E65}"/>
+                    </a:ext>
+                  </a:extLst>
+                </p:cNvPr>
+                <p:cNvSpPr txBox="1"/>
+                <p:nvPr/>
+              </p:nvSpPr>
+              <p:spPr>
+                <a:xfrm>
+                  <a:off x="1981200" y="1880157"/>
+                  <a:ext cx="2698812" cy="369332"/>
+                </a:xfrm>
+                <a:prstGeom prst="rect">
+                  <a:avLst/>
+                </a:prstGeom>
+                <a:noFill/>
+              </p:spPr>
+              <p:txBody>
+                <a:bodyPr wrap="square" rtlCol="0">
+                  <a:spAutoFit/>
+                </a:bodyPr>
+                <a:lstStyle/>
+                <a:p>
+                  <a:pPr algn="ctr"/>
+                  <a:r>
+                    <a:rPr lang="en-SG" dirty="0">
+                      <a:solidFill>
+                        <a:srgbClr val="FF0000"/>
+                      </a:solidFill>
+                    </a:rPr>
+                    <a:t>Confirmation message</a:t>
+                  </a:r>
+                </a:p>
+              </p:txBody>
+            </p:sp>
+          </p:grpSp>
           <p:pic>
             <p:nvPicPr>
-              <p:cNvPr id="4" name="Picture 3">
+              <p:cNvPr id="11" name="Picture 10">
                 <a:extLst>
                   <a:ext uri="{FF2B5EF4-FFF2-40B4-BE49-F238E27FC236}">
-                    <a16:creationId xmlns:a16="http://schemas.microsoft.com/office/drawing/2014/main" id="{7BB2E53D-51D0-4D37-89A3-C922B692011B}"/>
+                    <a16:creationId xmlns:a16="http://schemas.microsoft.com/office/drawing/2014/main" id="{6BF78B2B-E436-4820-88CD-CCD169B43A2B}"/>
                   </a:ext>
                 </a:extLst>
               </p:cNvPr>
@@ -3936,212 +4176,80 @@
               <p:nvPr/>
             </p:nvPicPr>
             <p:blipFill>
-              <a:blip r:embed="rId2"/>
+              <a:blip r:embed="rId3"/>
               <a:stretch>
                 <a:fillRect/>
               </a:stretch>
             </p:blipFill>
             <p:spPr>
               <a:xfrm>
-                <a:off x="1527414" y="190219"/>
-                <a:ext cx="9137172" cy="6477561"/>
+                <a:off x="6375646" y="4346862"/>
+                <a:ext cx="2583404" cy="525826"/>
               </a:xfrm>
               <a:prstGeom prst="rect">
                 <a:avLst/>
               </a:prstGeom>
             </p:spPr>
           </p:pic>
-          <p:sp>
-            <p:nvSpPr>
-              <p:cNvPr id="5" name="Rectangle 4">
-                <a:extLst>
-                  <a:ext uri="{FF2B5EF4-FFF2-40B4-BE49-F238E27FC236}">
-                    <a16:creationId xmlns:a16="http://schemas.microsoft.com/office/drawing/2014/main" id="{01CAAEE8-929D-4C66-8B7D-4B4DDA129D5E}"/>
-                  </a:ext>
-                </a:extLst>
-              </p:cNvPr>
-              <p:cNvSpPr/>
-              <p:nvPr/>
-            </p:nvSpPr>
-            <p:spPr>
-              <a:xfrm>
-                <a:off x="6295192" y="4301323"/>
-                <a:ext cx="4127191" cy="616905"/>
-              </a:xfrm>
-              <a:prstGeom prst="rect">
-                <a:avLst/>
-              </a:prstGeom>
+        </p:grpSp>
+        <p:sp>
+          <p:nvSpPr>
+            <p:cNvPr id="2" name="Rectangle 1">
+              <a:extLst>
+                <a:ext uri="{FF2B5EF4-FFF2-40B4-BE49-F238E27FC236}">
+                  <a16:creationId xmlns:a16="http://schemas.microsoft.com/office/drawing/2014/main" id="{6B05F420-CB03-417D-9B0A-12DB7C2D01F4}"/>
+                </a:ext>
+              </a:extLst>
+            </p:cNvPr>
+            <p:cNvSpPr/>
+            <p:nvPr/>
+          </p:nvSpPr>
+          <p:spPr>
+            <a:xfrm>
+              <a:off x="6375646" y="4714239"/>
+              <a:ext cx="2372114" cy="179003"/>
+            </a:xfrm>
+            <a:prstGeom prst="rect">
+              <a:avLst/>
+            </a:prstGeom>
+            <a:solidFill>
+              <a:srgbClr val="92E1F9"/>
+            </a:solidFill>
+            <a:ln>
               <a:noFill/>
-              <a:ln w="38100">
-                <a:solidFill>
-                  <a:srgbClr val="FF0000"/>
-                </a:solidFill>
-              </a:ln>
-            </p:spPr>
-            <p:style>
-              <a:lnRef idx="2">
-                <a:schemeClr val="accent1">
-                  <a:shade val="50000"/>
-                </a:schemeClr>
-              </a:lnRef>
-              <a:fillRef idx="1">
-                <a:schemeClr val="accent1"/>
-              </a:fillRef>
-              <a:effectRef idx="0">
-                <a:schemeClr val="accent1"/>
-              </a:effectRef>
-              <a:fontRef idx="minor">
-                <a:schemeClr val="lt1"/>
-              </a:fontRef>
-            </p:style>
-            <p:txBody>
-              <a:bodyPr rtlCol="0" anchor="ctr"/>
-              <a:lstStyle/>
-              <a:p>
-                <a:pPr algn="ctr"/>
-                <a:endParaRPr lang="en-SG"/>
-              </a:p>
-            </p:txBody>
-          </p:sp>
-          <p:sp>
-            <p:nvSpPr>
-              <p:cNvPr id="6" name="Rectangle 5">
-                <a:extLst>
-                  <a:ext uri="{FF2B5EF4-FFF2-40B4-BE49-F238E27FC236}">
-                    <a16:creationId xmlns:a16="http://schemas.microsoft.com/office/drawing/2014/main" id="{FC8A94D2-2A58-4630-A9F8-7C0B86C8E63F}"/>
-                  </a:ext>
-                </a:extLst>
-              </p:cNvPr>
-              <p:cNvSpPr/>
-              <p:nvPr/>
-            </p:nvSpPr>
-            <p:spPr>
-              <a:xfrm>
-                <a:off x="1802167" y="1603904"/>
-                <a:ext cx="8398276" cy="276232"/>
-              </a:xfrm>
-              <a:prstGeom prst="rect">
-                <a:avLst/>
-              </a:prstGeom>
-              <a:noFill/>
-              <a:ln w="38100">
-                <a:solidFill>
-                  <a:srgbClr val="FF0000"/>
-                </a:solidFill>
-              </a:ln>
-            </p:spPr>
-            <p:style>
-              <a:lnRef idx="2">
-                <a:schemeClr val="accent1">
-                  <a:shade val="50000"/>
-                </a:schemeClr>
-              </a:lnRef>
-              <a:fillRef idx="1">
-                <a:schemeClr val="accent1"/>
-              </a:fillRef>
-              <a:effectRef idx="0">
-                <a:schemeClr val="accent1"/>
-              </a:effectRef>
-              <a:fontRef idx="minor">
-                <a:schemeClr val="lt1"/>
-              </a:fontRef>
-            </p:style>
-            <p:txBody>
-              <a:bodyPr rtlCol="0" anchor="ctr"/>
-              <a:lstStyle/>
-              <a:p>
-                <a:pPr algn="ctr"/>
-                <a:endParaRPr lang="en-SG"/>
-              </a:p>
-            </p:txBody>
-          </p:sp>
-          <p:sp>
-            <p:nvSpPr>
-              <p:cNvPr id="8" name="TextBox 7">
-                <a:extLst>
-                  <a:ext uri="{FF2B5EF4-FFF2-40B4-BE49-F238E27FC236}">
-                    <a16:creationId xmlns:a16="http://schemas.microsoft.com/office/drawing/2014/main" id="{96CA8365-996B-4818-8115-F9717BCF9969}"/>
-                  </a:ext>
-                </a:extLst>
-              </p:cNvPr>
-              <p:cNvSpPr txBox="1"/>
-              <p:nvPr/>
-            </p:nvSpPr>
-            <p:spPr>
-              <a:xfrm>
-                <a:off x="6295192" y="4938783"/>
-                <a:ext cx="3275860" cy="369332"/>
-              </a:xfrm>
-              <a:prstGeom prst="rect">
-                <a:avLst/>
-              </a:prstGeom>
-              <a:noFill/>
-            </p:spPr>
-            <p:txBody>
-              <a:bodyPr wrap="square" rtlCol="0">
-                <a:spAutoFit/>
-              </a:bodyPr>
-              <a:lstStyle/>
-              <a:p>
-                <a:pPr algn="ctr"/>
-                <a:r>
-                  <a:rPr lang="en-SG" dirty="0">
-                    <a:solidFill>
-                      <a:srgbClr val="FF0000"/>
-                    </a:solidFill>
-                  </a:rPr>
-                  <a:t>New itinerary has been created!</a:t>
-                </a:r>
-              </a:p>
-            </p:txBody>
-          </p:sp>
-          <p:sp>
-            <p:nvSpPr>
-              <p:cNvPr id="9" name="TextBox 8">
-                <a:extLst>
-                  <a:ext uri="{FF2B5EF4-FFF2-40B4-BE49-F238E27FC236}">
-                    <a16:creationId xmlns:a16="http://schemas.microsoft.com/office/drawing/2014/main" id="{33550A51-5C89-46C5-98D4-595BFC541E65}"/>
-                  </a:ext>
-                </a:extLst>
-              </p:cNvPr>
-              <p:cNvSpPr txBox="1"/>
-              <p:nvPr/>
-            </p:nvSpPr>
-            <p:spPr>
-              <a:xfrm>
-                <a:off x="1981200" y="1880157"/>
-                <a:ext cx="2698812" cy="369332"/>
-              </a:xfrm>
-              <a:prstGeom prst="rect">
-                <a:avLst/>
-              </a:prstGeom>
-              <a:noFill/>
-            </p:spPr>
-            <p:txBody>
-              <a:bodyPr wrap="square" rtlCol="0">
-                <a:spAutoFit/>
-              </a:bodyPr>
-              <a:lstStyle/>
-              <a:p>
-                <a:pPr algn="ctr"/>
-                <a:r>
-                  <a:rPr lang="en-SG" dirty="0">
-                    <a:solidFill>
-                      <a:srgbClr val="FF0000"/>
-                    </a:solidFill>
-                  </a:rPr>
-                  <a:t>Confirmation message</a:t>
-                </a:r>
-              </a:p>
-            </p:txBody>
-          </p:sp>
-        </p:grpSp>
+            </a:ln>
+          </p:spPr>
+          <p:style>
+            <a:lnRef idx="2">
+              <a:schemeClr val="accent1">
+                <a:shade val="50000"/>
+              </a:schemeClr>
+            </a:lnRef>
+            <a:fillRef idx="1">
+              <a:schemeClr val="accent1"/>
+            </a:fillRef>
+            <a:effectRef idx="0">
+              <a:schemeClr val="accent1"/>
+            </a:effectRef>
+            <a:fontRef idx="minor">
+              <a:schemeClr val="lt1"/>
+            </a:fontRef>
+          </p:style>
+          <p:txBody>
+            <a:bodyPr rtlCol="0" anchor="ctr"/>
+            <a:lstStyle/>
+            <a:p>
+              <a:pPr algn="ctr"/>
+              <a:endParaRPr lang="en-SG"/>
+            </a:p>
+          </p:txBody>
+        </p:sp>
         <p:pic>
           <p:nvPicPr>
-            <p:cNvPr id="11" name="Picture 10">
+            <p:cNvPr id="3" name="Picture 2">
               <a:extLst>
                 <a:ext uri="{FF2B5EF4-FFF2-40B4-BE49-F238E27FC236}">
-                  <a16:creationId xmlns:a16="http://schemas.microsoft.com/office/drawing/2014/main" id="{6BF78B2B-E436-4820-88CD-CCD169B43A2B}"/>
+                  <a16:creationId xmlns:a16="http://schemas.microsoft.com/office/drawing/2014/main" id="{BE85E632-37BB-4944-A2C4-3317F8AD0F4B}"/>
                 </a:ext>
               </a:extLst>
             </p:cNvPr>
@@ -4150,16 +4258,15 @@
             </p:cNvPicPr>
             <p:nvPr/>
           </p:nvPicPr>
-          <p:blipFill>
-            <a:blip r:embed="rId3"/>
-            <a:stretch>
-              <a:fillRect/>
-            </a:stretch>
+          <p:blipFill rotWithShape="1">
+            <a:blip r:embed="rId2"/>
+            <a:srcRect l="55204" t="69935" r="20334" b="27619"/>
+            <a:stretch/>
           </p:blipFill>
           <p:spPr>
             <a:xfrm>
-              <a:off x="6375646" y="4346862"/>
-              <a:ext cx="2583404" cy="525826"/>
+              <a:off x="6393934" y="4724516"/>
+              <a:ext cx="2235162" cy="158448"/>
             </a:xfrm>
             <a:prstGeom prst="rect">
               <a:avLst/>

</xml_diff>